<commit_message>
Updates of the home page wwr
</commit_message>
<xml_diff>
--- a/wwr/images/Logo.pptx
+++ b/wwr/images/Logo.pptx
@@ -243,7 +243,7 @@
           <a:p>
             <a:fld id="{8D1E869F-06E3-4B7D-B874-F2930DC36111}" type="datetimeFigureOut">
               <a:rPr lang="en-US" smtClean="0"/>
-              <a:t>4/30/2022</a:t>
+              <a:t>5/11/2022</a:t>
             </a:fld>
             <a:endParaRPr lang="en-US"/>
           </a:p>
@@ -413,7 +413,7 @@
           <a:p>
             <a:fld id="{8D1E869F-06E3-4B7D-B874-F2930DC36111}" type="datetimeFigureOut">
               <a:rPr lang="en-US" smtClean="0"/>
-              <a:t>4/30/2022</a:t>
+              <a:t>5/11/2022</a:t>
             </a:fld>
             <a:endParaRPr lang="en-US"/>
           </a:p>
@@ -593,7 +593,7 @@
           <a:p>
             <a:fld id="{8D1E869F-06E3-4B7D-B874-F2930DC36111}" type="datetimeFigureOut">
               <a:rPr lang="en-US" smtClean="0"/>
-              <a:t>4/30/2022</a:t>
+              <a:t>5/11/2022</a:t>
             </a:fld>
             <a:endParaRPr lang="en-US"/>
           </a:p>
@@ -763,7 +763,7 @@
           <a:p>
             <a:fld id="{8D1E869F-06E3-4B7D-B874-F2930DC36111}" type="datetimeFigureOut">
               <a:rPr lang="en-US" smtClean="0"/>
-              <a:t>4/30/2022</a:t>
+              <a:t>5/11/2022</a:t>
             </a:fld>
             <a:endParaRPr lang="en-US"/>
           </a:p>
@@ -1009,7 +1009,7 @@
           <a:p>
             <a:fld id="{8D1E869F-06E3-4B7D-B874-F2930DC36111}" type="datetimeFigureOut">
               <a:rPr lang="en-US" smtClean="0"/>
-              <a:t>4/30/2022</a:t>
+              <a:t>5/11/2022</a:t>
             </a:fld>
             <a:endParaRPr lang="en-US"/>
           </a:p>
@@ -1241,7 +1241,7 @@
           <a:p>
             <a:fld id="{8D1E869F-06E3-4B7D-B874-F2930DC36111}" type="datetimeFigureOut">
               <a:rPr lang="en-US" smtClean="0"/>
-              <a:t>4/30/2022</a:t>
+              <a:t>5/11/2022</a:t>
             </a:fld>
             <a:endParaRPr lang="en-US"/>
           </a:p>
@@ -1608,7 +1608,7 @@
           <a:p>
             <a:fld id="{8D1E869F-06E3-4B7D-B874-F2930DC36111}" type="datetimeFigureOut">
               <a:rPr lang="en-US" smtClean="0"/>
-              <a:t>4/30/2022</a:t>
+              <a:t>5/11/2022</a:t>
             </a:fld>
             <a:endParaRPr lang="en-US"/>
           </a:p>
@@ -1726,7 +1726,7 @@
           <a:p>
             <a:fld id="{8D1E869F-06E3-4B7D-B874-F2930DC36111}" type="datetimeFigureOut">
               <a:rPr lang="en-US" smtClean="0"/>
-              <a:t>4/30/2022</a:t>
+              <a:t>5/11/2022</a:t>
             </a:fld>
             <a:endParaRPr lang="en-US"/>
           </a:p>
@@ -1821,7 +1821,7 @@
           <a:p>
             <a:fld id="{8D1E869F-06E3-4B7D-B874-F2930DC36111}" type="datetimeFigureOut">
               <a:rPr lang="en-US" smtClean="0"/>
-              <a:t>4/30/2022</a:t>
+              <a:t>5/11/2022</a:t>
             </a:fld>
             <a:endParaRPr lang="en-US"/>
           </a:p>
@@ -2098,7 +2098,7 @@
           <a:p>
             <a:fld id="{8D1E869F-06E3-4B7D-B874-F2930DC36111}" type="datetimeFigureOut">
               <a:rPr lang="en-US" smtClean="0"/>
-              <a:t>4/30/2022</a:t>
+              <a:t>5/11/2022</a:t>
             </a:fld>
             <a:endParaRPr lang="en-US"/>
           </a:p>
@@ -2351,7 +2351,7 @@
           <a:p>
             <a:fld id="{8D1E869F-06E3-4B7D-B874-F2930DC36111}" type="datetimeFigureOut">
               <a:rPr lang="en-US" smtClean="0"/>
-              <a:t>4/30/2022</a:t>
+              <a:t>5/11/2022</a:t>
             </a:fld>
             <a:endParaRPr lang="en-US"/>
           </a:p>
@@ -2564,7 +2564,7 @@
           <a:p>
             <a:fld id="{8D1E869F-06E3-4B7D-B874-F2930DC36111}" type="datetimeFigureOut">
               <a:rPr lang="en-US" smtClean="0"/>
-              <a:t>4/30/2022</a:t>
+              <a:t>5/11/2022</a:t>
             </a:fld>
             <a:endParaRPr lang="en-US"/>
           </a:p>
@@ -3033,7 +3033,7 @@
         </p:blipFill>
         <p:spPr>
           <a:xfrm>
-            <a:off x="3638938" y="1317171"/>
+            <a:off x="3638935" y="1317171"/>
             <a:ext cx="4338735" cy="4338735"/>
           </a:xfrm>
           <a:prstGeom prst="rect">
@@ -3049,7 +3049,7 @@
         </p:nvSpPr>
         <p:spPr>
           <a:xfrm>
-            <a:off x="3512974" y="1296961"/>
+            <a:off x="3512973" y="1194730"/>
             <a:ext cx="4590661" cy="923330"/>
           </a:xfrm>
           <a:prstGeom prst="rect">
@@ -3065,7 +3065,7 @@
           <a:p>
             <a:pPr algn="ctr"/>
             <a:r>
-              <a:rPr lang="es-ES" sz="5400" b="1" dirty="0" err="1" smtClean="0">
+              <a:rPr lang="es-ES" sz="5400" b="1" dirty="0" smtClean="0">
                 <a:solidFill>
                   <a:srgbClr val="990000"/>
                 </a:solidFill>
@@ -3090,7 +3090,7 @@
         </p:nvSpPr>
         <p:spPr>
           <a:xfrm>
-            <a:off x="3512973" y="4789700"/>
+            <a:off x="3512973" y="4732576"/>
             <a:ext cx="4590661" cy="923330"/>
           </a:xfrm>
           <a:prstGeom prst="rect">

</xml_diff>